<commit_message>
Backup before switch to OO
</commit_message>
<xml_diff>
--- a/Mor presi.pptx
+++ b/Mor presi.pptx
@@ -352,7 +352,7 @@
             </a:pPr>
             <a:fld id="{AD3F0D3D-35E2-4A02-AEA5-1E37B718E2E6}" type="datetime4">
               <a:rPr lang="de-DE" smtClean="0"/>
-              <a:t>18. Januar 2023</a:t>
+              <a:t>23. Januar 2023</a:t>
             </a:fld>
             <a:endParaRPr lang="de-DE"/>
           </a:p>
@@ -767,7 +767,7 @@
             </a:pPr>
             <a:fld id="{6B5962C4-58D5-4433-97D5-012F56D2057C}" type="datetime4">
               <a:rPr lang="de-DE" smtClean="0"/>
-              <a:t>18. Januar 2023</a:t>
+              <a:t>23. Januar 2023</a:t>
             </a:fld>
             <a:endParaRPr lang="de-DE"/>
           </a:p>
@@ -1397,7 +1397,6 @@
               <a:bodyPr/>
               <a:lstStyle/>
               <a:p>
-                <a:pPr/>
                 <a:r>
                   <a:rPr lang="de-DE" dirty="0"/>
                   <a:t>RBM begriff recherchieren</a:t>
@@ -1454,7 +1453,7 @@
             </a:pPr>
             <a:fld id="{6B5962C4-58D5-4433-97D5-012F56D2057C}" type="datetime4">
               <a:rPr lang="de-DE" smtClean="0"/>
-              <a:t>18. Januar 2023</a:t>
+              <a:t>23. Januar 2023</a:t>
             </a:fld>
             <a:endParaRPr lang="de-DE"/>
           </a:p>
@@ -1602,7 +1601,7 @@
             </a:pPr>
             <a:fld id="{6B5962C4-58D5-4433-97D5-012F56D2057C}" type="datetime4">
               <a:rPr lang="de-DE" smtClean="0"/>
-              <a:t>20. Januar 2023</a:t>
+              <a:t>23. Januar 2023</a:t>
             </a:fld>
             <a:endParaRPr lang="de-DE"/>
           </a:p>
@@ -1770,7 +1769,7 @@
             </a:pPr>
             <a:fld id="{6B5962C4-58D5-4433-97D5-012F56D2057C}" type="datetime4">
               <a:rPr lang="de-DE" smtClean="0"/>
-              <a:t>20. Januar 2023</a:t>
+              <a:t>23. Januar 2023</a:t>
             </a:fld>
             <a:endParaRPr lang="de-DE"/>
           </a:p>
@@ -2002,7 +2001,7 @@
             </a:pPr>
             <a:fld id="{6B5962C4-58D5-4433-97D5-012F56D2057C}" type="datetime4">
               <a:rPr lang="de-DE" smtClean="0"/>
-              <a:t>20. Januar 2023</a:t>
+              <a:t>23. Januar 2023</a:t>
             </a:fld>
             <a:endParaRPr lang="de-DE"/>
           </a:p>
@@ -2170,7 +2169,7 @@
             </a:pPr>
             <a:fld id="{6B5962C4-58D5-4433-97D5-012F56D2057C}" type="datetime4">
               <a:rPr lang="de-DE" smtClean="0"/>
-              <a:t>18. Januar 2023</a:t>
+              <a:t>23. Januar 2023</a:t>
             </a:fld>
             <a:endParaRPr lang="de-DE"/>
           </a:p>
@@ -2318,7 +2317,7 @@
             </a:pPr>
             <a:fld id="{6B5962C4-58D5-4433-97D5-012F56D2057C}" type="datetime4">
               <a:rPr lang="de-DE" smtClean="0"/>
-              <a:t>19. Januar 2023</a:t>
+              <a:t>23. Januar 2023</a:t>
             </a:fld>
             <a:endParaRPr lang="de-DE"/>
           </a:p>
@@ -2466,7 +2465,7 @@
             </a:pPr>
             <a:fld id="{6B5962C4-58D5-4433-97D5-012F56D2057C}" type="datetime4">
               <a:rPr lang="de-DE" smtClean="0"/>
-              <a:t>19. Januar 2023</a:t>
+              <a:t>23. Januar 2023</a:t>
             </a:fld>
             <a:endParaRPr lang="de-DE"/>
           </a:p>
@@ -5544,7 +5543,7 @@
             </a:r>
             <a:r>
               <a:rPr lang="de-DE" dirty="0"/>
-              <a:t> - WG Transition </a:t>
+              <a:t> – WG Transition </a:t>
             </a:r>
           </a:p>
         </p:txBody>
@@ -6503,7 +6502,7 @@
             </a:r>
             <a:r>
               <a:rPr lang="de-DE" dirty="0"/>
-              <a:t> - WG Transition </a:t>
+              <a:t> – WG Transition </a:t>
             </a:r>
           </a:p>
         </p:txBody>
@@ -7408,8 +7407,8 @@
           </p:cxnSp>
         </p:grpSp>
       </p:grpSp>
-      <mc:AlternateContent xmlns:mc="http://schemas.openxmlformats.org/markup-compatibility/2006">
-        <mc:Choice xmlns:a14="http://schemas.microsoft.com/office/drawing/2010/main" Requires="a14">
+      <mc:AlternateContent xmlns:mc="http://schemas.openxmlformats.org/markup-compatibility/2006" xmlns:a14="http://schemas.microsoft.com/office/drawing/2010/main">
+        <mc:Choice Requires="a14">
           <p:sp>
             <p:nvSpPr>
               <p:cNvPr id="7" name="Inhaltsplatzhalter 2">
@@ -7542,7 +7541,7 @@
             </p:txBody>
           </p:sp>
         </mc:Choice>
-        <mc:Fallback>
+        <mc:Fallback xmlns="">
           <p:sp>
             <p:nvSpPr>
               <p:cNvPr id="7" name="Inhaltsplatzhalter 2">
@@ -8036,8 +8035,8 @@
           </a:prstGeom>
         </p:spPr>
       </p:pic>
-      <mc:AlternateContent xmlns:mc="http://schemas.openxmlformats.org/markup-compatibility/2006">
-        <mc:Choice xmlns:a14="http://schemas.microsoft.com/office/drawing/2010/main" Requires="a14">
+      <mc:AlternateContent xmlns:mc="http://schemas.openxmlformats.org/markup-compatibility/2006" xmlns:a14="http://schemas.microsoft.com/office/drawing/2010/main">
+        <mc:Choice Requires="a14">
           <p:sp>
             <p:nvSpPr>
               <p:cNvPr id="7" name="Inhaltsplatzhalter 2">
@@ -8320,7 +8319,7 @@
             </p:txBody>
           </p:sp>
         </mc:Choice>
-        <mc:Fallback>
+        <mc:Fallback xmlns="">
           <p:sp>
             <p:nvSpPr>
               <p:cNvPr id="7" name="Inhaltsplatzhalter 2">
@@ -8707,6 +8706,26 @@
                   <a:t> </a:t>
                 </a:r>
               </a:p>
+              <a:p>
+                <a:pPr lvl="2"/>
+                <a:r>
+                  <a:rPr lang="de-DE" dirty="0"/>
+                  <a:t>20…100 </a:t>
+                </a:r>
+                <a:r>
+                  <a:rPr lang="de-DE" dirty="0" err="1"/>
+                  <a:t>basis</a:t>
+                </a:r>
+                <a:r>
+                  <a:rPr lang="de-DE" dirty="0"/>
+                  <a:t> </a:t>
+                </a:r>
+                <a:r>
+                  <a:rPr lang="de-DE" dirty="0" err="1"/>
+                  <a:t>functions</a:t>
+                </a:r>
+                <a:endParaRPr lang="de-DE" dirty="0"/>
+              </a:p>
             </p:txBody>
           </p:sp>
         </mc:Choice>
@@ -9200,11 +9219,11 @@
             </a:r>
             <a:r>
               <a:rPr lang="de-DE" dirty="0"/>
-              <a:t> slow in </a:t>
-            </a:r>
-            <a:r>
-              <a:rPr lang="de-DE" dirty="0" err="1"/>
-              <a:t>python</a:t>
+              <a:t> slow </a:t>
+            </a:r>
+            <a:r>
+              <a:rPr lang="de-DE"/>
+              <a:t>inP</a:t>
             </a:r>
             <a:endParaRPr lang="de-DE" dirty="0"/>
           </a:p>
@@ -11582,12 +11601,170 @@
           </a:p>
         </p:txBody>
       </p:sp>
+      <p:grpSp>
+        <p:nvGrpSpPr>
+          <p:cNvPr id="11" name="Gruppieren 10">
+            <a:extLst>
+              <a:ext uri="{FF2B5EF4-FFF2-40B4-BE49-F238E27FC236}">
+                <a16:creationId xmlns:a16="http://schemas.microsoft.com/office/drawing/2014/main" id="{1ABF49EF-C1BC-94A5-07C7-39332E71463E}"/>
+              </a:ext>
+            </a:extLst>
+          </p:cNvPr>
+          <p:cNvGrpSpPr/>
+          <p:nvPr/>
+        </p:nvGrpSpPr>
+        <p:grpSpPr>
+          <a:xfrm>
+            <a:off x="1586948" y="3389071"/>
+            <a:ext cx="5970103" cy="2176789"/>
+            <a:chOff x="258081" y="3736487"/>
+            <a:chExt cx="5970103" cy="2711764"/>
+          </a:xfrm>
+        </p:grpSpPr>
+        <p:pic>
+          <p:nvPicPr>
+            <p:cNvPr id="8" name="Grafik 7">
+              <a:extLst>
+                <a:ext uri="{FF2B5EF4-FFF2-40B4-BE49-F238E27FC236}">
+                  <a16:creationId xmlns:a16="http://schemas.microsoft.com/office/drawing/2014/main" id="{DAFBA319-AEA3-9AFC-8D8E-BB0FB8AA6F11}"/>
+                </a:ext>
+              </a:extLst>
+            </p:cNvPr>
+            <p:cNvPicPr>
+              <a:picLocks noChangeAspect="1"/>
+            </p:cNvPicPr>
+            <p:nvPr/>
+          </p:nvPicPr>
+          <p:blipFill rotWithShape="1">
+            <a:blip r:embed="rId2"/>
+            <a:srcRect t="2143" r="6295"/>
+            <a:stretch/>
+          </p:blipFill>
+          <p:spPr>
+            <a:xfrm>
+              <a:off x="258081" y="3825695"/>
+              <a:ext cx="5878694" cy="2622556"/>
+            </a:xfrm>
+            <a:prstGeom prst="rect">
+              <a:avLst/>
+            </a:prstGeom>
+          </p:spPr>
+        </p:pic>
+        <p:sp>
+          <p:nvSpPr>
+            <p:cNvPr id="9" name="Rechteck 8">
+              <a:extLst>
+                <a:ext uri="{FF2B5EF4-FFF2-40B4-BE49-F238E27FC236}">
+                  <a16:creationId xmlns:a16="http://schemas.microsoft.com/office/drawing/2014/main" id="{1D99344D-6A47-7A58-C509-5DBD3E4BF830}"/>
+                </a:ext>
+              </a:extLst>
+            </p:cNvPr>
+            <p:cNvSpPr/>
+            <p:nvPr/>
+          </p:nvSpPr>
+          <p:spPr>
+            <a:xfrm>
+              <a:off x="5904148" y="3736487"/>
+              <a:ext cx="324036" cy="213219"/>
+            </a:xfrm>
+            <a:prstGeom prst="rect">
+              <a:avLst/>
+            </a:prstGeom>
+            <a:solidFill>
+              <a:schemeClr val="bg1"/>
+            </a:solidFill>
+            <a:ln>
+              <a:solidFill>
+                <a:schemeClr val="bg1"/>
+              </a:solidFill>
+            </a:ln>
+          </p:spPr>
+          <p:style>
+            <a:lnRef idx="2">
+              <a:schemeClr val="accent1">
+                <a:shade val="50000"/>
+              </a:schemeClr>
+            </a:lnRef>
+            <a:fillRef idx="1">
+              <a:schemeClr val="accent1"/>
+            </a:fillRef>
+            <a:effectRef idx="0">
+              <a:schemeClr val="accent1"/>
+            </a:effectRef>
+            <a:fontRef idx="minor">
+              <a:schemeClr val="lt1"/>
+            </a:fontRef>
+          </p:style>
+          <p:txBody>
+            <a:bodyPr rtlCol="0" anchor="ctr"/>
+            <a:lstStyle/>
+            <a:p>
+              <a:pPr algn="ctr"/>
+              <a:endParaRPr lang="de-DE"/>
+            </a:p>
+          </p:txBody>
+        </p:sp>
+        <p:sp>
+          <p:nvSpPr>
+            <p:cNvPr id="10" name="Rechteck 9">
+              <a:extLst>
+                <a:ext uri="{FF2B5EF4-FFF2-40B4-BE49-F238E27FC236}">
+                  <a16:creationId xmlns:a16="http://schemas.microsoft.com/office/drawing/2014/main" id="{D7C81CFC-313B-067F-3C0C-433494066A0C}"/>
+                </a:ext>
+              </a:extLst>
+            </p:cNvPr>
+            <p:cNvSpPr/>
+            <p:nvPr/>
+          </p:nvSpPr>
+          <p:spPr>
+            <a:xfrm>
+              <a:off x="6072177" y="4038914"/>
+              <a:ext cx="156007" cy="213219"/>
+            </a:xfrm>
+            <a:prstGeom prst="rect">
+              <a:avLst/>
+            </a:prstGeom>
+            <a:solidFill>
+              <a:schemeClr val="bg1"/>
+            </a:solidFill>
+            <a:ln>
+              <a:solidFill>
+                <a:schemeClr val="bg1"/>
+              </a:solidFill>
+            </a:ln>
+          </p:spPr>
+          <p:style>
+            <a:lnRef idx="2">
+              <a:schemeClr val="accent1">
+                <a:shade val="50000"/>
+              </a:schemeClr>
+            </a:lnRef>
+            <a:fillRef idx="1">
+              <a:schemeClr val="accent1"/>
+            </a:fillRef>
+            <a:effectRef idx="0">
+              <a:schemeClr val="accent1"/>
+            </a:effectRef>
+            <a:fontRef idx="minor">
+              <a:schemeClr val="lt1"/>
+            </a:fontRef>
+          </p:style>
+          <p:txBody>
+            <a:bodyPr rtlCol="0" anchor="ctr"/>
+            <a:lstStyle/>
+            <a:p>
+              <a:pPr algn="ctr"/>
+              <a:endParaRPr lang="de-DE"/>
+            </a:p>
+          </p:txBody>
+        </p:sp>
+      </p:grpSp>
       <p:pic>
         <p:nvPicPr>
-          <p:cNvPr id="8" name="Grafik 7">
+          <p:cNvPr id="12" name="Grafik 11">
             <a:extLst>
               <a:ext uri="{FF2B5EF4-FFF2-40B4-BE49-F238E27FC236}">
-                <a16:creationId xmlns:a16="http://schemas.microsoft.com/office/drawing/2014/main" id="{DAFBA319-AEA3-9AFC-8D8E-BB0FB8AA6F11}"/>
+                <a16:creationId xmlns:a16="http://schemas.microsoft.com/office/drawing/2014/main" id="{12782725-0AF8-CF5F-38C2-6470D3B01341}"/>
               </a:ext>
             </a:extLst>
           </p:cNvPr>
@@ -11597,59 +11774,20 @@
           <p:nvPr/>
         </p:nvPicPr>
         <p:blipFill rotWithShape="1">
-          <a:blip r:embed="rId2"/>
-          <a:srcRect t="2143" r="6295"/>
+          <a:blip r:embed="rId3"/>
+          <a:srcRect l="4720" t="32786" r="4720" b="31880"/>
           <a:stretch/>
         </p:blipFill>
         <p:spPr>
           <a:xfrm>
-            <a:off x="258081" y="3825695"/>
-            <a:ext cx="5878694" cy="2622556"/>
+            <a:off x="2312181" y="5667925"/>
+            <a:ext cx="4504140" cy="763235"/>
           </a:xfrm>
           <a:prstGeom prst="rect">
             <a:avLst/>
           </a:prstGeom>
         </p:spPr>
       </p:pic>
-      <p:sp>
-        <p:nvSpPr>
-          <p:cNvPr id="7" name="Textfeld 6">
-            <a:extLst>
-              <a:ext uri="{FF2B5EF4-FFF2-40B4-BE49-F238E27FC236}">
-                <a16:creationId xmlns:a16="http://schemas.microsoft.com/office/drawing/2014/main" id="{6137C554-38C2-4687-3570-059FD17EE6B9}"/>
-              </a:ext>
-            </a:extLst>
-          </p:cNvPr>
-          <p:cNvSpPr txBox="1"/>
-          <p:nvPr/>
-        </p:nvSpPr>
-        <p:spPr>
-          <a:xfrm>
-            <a:off x="6588224" y="4113076"/>
-            <a:ext cx="1127232" cy="369332"/>
-          </a:xfrm>
-          <a:prstGeom prst="rect">
-            <a:avLst/>
-          </a:prstGeom>
-          <a:noFill/>
-        </p:spPr>
-        <p:txBody>
-          <a:bodyPr wrap="none" rtlCol="0">
-            <a:spAutoFit/>
-          </a:bodyPr>
-          <a:lstStyle/>
-          <a:p>
-            <a:r>
-              <a:rPr lang="de-DE" dirty="0">
-                <a:solidFill>
-                  <a:srgbClr val="FF0000"/>
-                </a:solidFill>
-              </a:rPr>
-              <a:t>+Struktur</a:t>
-            </a:r>
-          </a:p>
-        </p:txBody>
-      </p:sp>
     </p:spTree>
     <p:extLst>
       <p:ext uri="{BB962C8B-B14F-4D97-AF65-F5344CB8AC3E}">
@@ -11905,7 +12043,42 @@
               <a:rPr lang="de-DE" dirty="0" err="1"/>
               <a:t>expansions</a:t>
             </a:r>
-            <a:endParaRPr lang="de-DE" dirty="0"/>
+            <a:r>
+              <a:rPr lang="de-DE" dirty="0"/>
+              <a:t> </a:t>
+            </a:r>
+            <a:r>
+              <a:rPr lang="de-DE" dirty="0" err="1"/>
+              <a:t>of</a:t>
+            </a:r>
+            <a:r>
+              <a:rPr lang="de-DE" dirty="0"/>
+              <a:t> </a:t>
+            </a:r>
+            <a:r>
+              <a:rPr lang="de-DE" dirty="0" err="1"/>
+              <a:t>the</a:t>
+            </a:r>
+            <a:r>
+              <a:rPr lang="de-DE" dirty="0"/>
+              <a:t> </a:t>
+            </a:r>
+            <a:r>
+              <a:rPr lang="de-DE" dirty="0" err="1"/>
+              <a:t>weak</a:t>
+            </a:r>
+            <a:r>
+              <a:rPr lang="de-DE" dirty="0"/>
+              <a:t> </a:t>
+            </a:r>
+            <a:r>
+              <a:rPr lang="de-DE" dirty="0" err="1"/>
+              <a:t>formulation</a:t>
+            </a:r>
+            <a:r>
+              <a:rPr lang="de-DE" dirty="0"/>
+              <a:t> </a:t>
+            </a:r>
           </a:p>
           <a:p>
             <a:pPr lvl="1"/>
@@ -12140,8 +12313,8 @@
           </a:p>
         </p:txBody>
       </p:sp>
-      <mc:AlternateContent xmlns:mc="http://schemas.openxmlformats.org/markup-compatibility/2006">
-        <mc:Choice xmlns:a14="http://schemas.microsoft.com/office/drawing/2010/main" Requires="a14">
+      <mc:AlternateContent xmlns:mc="http://schemas.openxmlformats.org/markup-compatibility/2006" xmlns:a14="http://schemas.microsoft.com/office/drawing/2010/main">
+        <mc:Choice Requires="a14">
           <p:sp>
             <p:nvSpPr>
               <p:cNvPr id="3" name="Inhaltsplatzhalter 2">
@@ -12662,7 +12835,7 @@
             </p:txBody>
           </p:sp>
         </mc:Choice>
-        <mc:Fallback>
+        <mc:Fallback xmlns="">
           <p:sp>
             <p:nvSpPr>
               <p:cNvPr id="3" name="Inhaltsplatzhalter 2">
@@ -12848,8 +13021,8 @@
           </a:p>
         </p:txBody>
       </p:sp>
-      <mc:AlternateContent xmlns:mc="http://schemas.openxmlformats.org/markup-compatibility/2006">
-        <mc:Choice xmlns:a14="http://schemas.microsoft.com/office/drawing/2010/main" Requires="a14">
+      <mc:AlternateContent xmlns:mc="http://schemas.openxmlformats.org/markup-compatibility/2006" xmlns:a14="http://schemas.microsoft.com/office/drawing/2010/main">
+        <mc:Choice Requires="a14">
           <p:sp>
             <p:nvSpPr>
               <p:cNvPr id="3" name="Inhaltsplatzhalter 2">
@@ -13195,7 +13368,7 @@
             </p:txBody>
           </p:sp>
         </mc:Choice>
-        <mc:Fallback>
+        <mc:Fallback xmlns="">
           <p:sp>
             <p:nvSpPr>
               <p:cNvPr id="3" name="Inhaltsplatzhalter 2">
@@ -13907,7 +14080,7 @@
             </a:r>
             <a:r>
               <a:rPr lang="de-DE" dirty="0" err="1"/>
-              <a:t>waveguide</a:t>
+              <a:t>Waveguide</a:t>
             </a:r>
             <a:endParaRPr lang="de-DE" dirty="0"/>
           </a:p>

</xml_diff>

<commit_message>
Nested Port based on QR dec
</commit_message>
<xml_diff>
--- a/Mor presi.pptx
+++ b/Mor presi.pptx
@@ -3120,7 +3120,7 @@
           <a:p>
             <a:r>
               <a:rPr lang="de-DE" dirty="0"/>
-              <a:t>22.9.2022</a:t>
+              <a:t>25.01.2023</a:t>
             </a:r>
           </a:p>
         </p:txBody>
@@ -3130,6 +3130,22 @@
   <p:clrMapOvr>
     <a:masterClrMapping/>
   </p:clrMapOvr>
+  <p:extLst>
+    <p:ext uri="{DCECCB84-F9BA-43D5-87BE-67443E8EF086}">
+      <p15:sldGuideLst xmlns:p15="http://schemas.microsoft.com/office/powerpoint/2012/main">
+        <p15:guide id="1" orient="horz" pos="2160" userDrawn="1">
+          <p15:clr>
+            <a:srgbClr val="FBAE40"/>
+          </p15:clr>
+        </p15:guide>
+        <p15:guide id="2" pos="2880" userDrawn="1">
+          <p15:clr>
+            <a:srgbClr val="FBAE40"/>
+          </p15:clr>
+        </p15:guide>
+      </p15:sldGuideLst>
+    </p:ext>
+  </p:extLst>
 </p:sldLayout>
 </file>
 
@@ -3393,7 +3409,7 @@
           <a:p>
             <a:r>
               <a:rPr lang="de-DE" dirty="0"/>
-              <a:t>22.9.2022</a:t>
+              <a:t>25.01.2023</a:t>
             </a:r>
           </a:p>
         </p:txBody>
@@ -4311,6 +4327,22 @@
       </a:lvl9pPr>
     </p:otherStyle>
   </p:txStyles>
+  <p:extLst>
+    <p:ext uri="{27BBF7A9-308A-43DC-89C8-2F10F3537804}">
+      <p15:sldGuideLst xmlns:p15="http://schemas.microsoft.com/office/powerpoint/2012/main">
+        <p15:guide id="1" orient="horz" pos="2160" userDrawn="1">
+          <p15:clr>
+            <a:srgbClr val="F26B43"/>
+          </p15:clr>
+        </p15:guide>
+        <p15:guide id="2" pos="2880" userDrawn="1">
+          <p15:clr>
+            <a:srgbClr val="F26B43"/>
+          </p15:clr>
+        </p15:guide>
+      </p15:sldGuideLst>
+    </p:ext>
+  </p:extLst>
 </p:sldMaster>
 </file>
 
@@ -4493,7 +4525,7 @@
           <a:p>
             <a:r>
               <a:rPr lang="de-DE" dirty="0"/>
-              <a:t>20.10.2022</a:t>
+              <a:t>25.01.2023</a:t>
             </a:r>
           </a:p>
         </p:txBody>
@@ -10290,6 +10322,25 @@
             <a:pPr lvl="1"/>
             <a:r>
               <a:rPr lang="de-DE" dirty="0" err="1"/>
+              <a:t>Only</a:t>
+            </a:r>
+            <a:r>
+              <a:rPr lang="de-DE" dirty="0"/>
+              <a:t> check </a:t>
+            </a:r>
+            <a:r>
+              <a:rPr lang="de-DE" dirty="0" err="1"/>
+              <a:t>some</a:t>
+            </a:r>
+            <a:r>
+              <a:rPr lang="de-DE" dirty="0"/>
+              <a:t> DOFs</a:t>
+            </a:r>
+          </a:p>
+          <a:p>
+            <a:pPr lvl="1"/>
+            <a:r>
+              <a:rPr lang="de-DE" dirty="0" err="1"/>
               <a:t>Truncation</a:t>
             </a:r>
             <a:r>
@@ -10338,7 +10389,6 @@
             <a:endParaRPr lang="de-DE" dirty="0"/>
           </a:p>
           <a:p>
-            <a:pPr lvl="1"/>
             <a:r>
               <a:rPr lang="de-DE" dirty="0"/>
               <a:t>Memory </a:t>
@@ -10360,7 +10410,7 @@
               <a:t> </a:t>
             </a:r>
             <a:r>
-              <a:rPr lang="de-DE"/>
+              <a:rPr lang="de-DE" dirty="0" err="1"/>
               <a:t>tradeoff</a:t>
             </a:r>
             <a:endParaRPr lang="de-DE" dirty="0"/>

</xml_diff>

<commit_message>
Selected DOF res calculation + theoretical ideas
This version contains a well working version of the nested Port Mat creation
</commit_message>
<xml_diff>
--- a/Mor presi.pptx
+++ b/Mor presi.pptx
@@ -5,10 +5,10 @@
     <p:sldMasterId id="2147483648" r:id="rId1"/>
   </p:sldMasterIdLst>
   <p:notesMasterIdLst>
-    <p:notesMasterId r:id="rId24"/>
+    <p:notesMasterId r:id="rId25"/>
   </p:notesMasterIdLst>
   <p:handoutMasterIdLst>
-    <p:handoutMasterId r:id="rId25"/>
+    <p:handoutMasterId r:id="rId26"/>
   </p:handoutMasterIdLst>
   <p:sldIdLst>
     <p:sldId id="260" r:id="rId2"/>
@@ -28,16 +28,17 @@
     <p:sldId id="335" r:id="rId16"/>
     <p:sldId id="337" r:id="rId17"/>
     <p:sldId id="336" r:id="rId18"/>
-    <p:sldId id="302" r:id="rId19"/>
-    <p:sldId id="324" r:id="rId20"/>
-    <p:sldId id="329" r:id="rId21"/>
-    <p:sldId id="319" r:id="rId22"/>
-    <p:sldId id="328" r:id="rId23"/>
+    <p:sldId id="698" r:id="rId19"/>
+    <p:sldId id="302" r:id="rId20"/>
+    <p:sldId id="324" r:id="rId21"/>
+    <p:sldId id="329" r:id="rId22"/>
+    <p:sldId id="319" r:id="rId23"/>
+    <p:sldId id="328" r:id="rId24"/>
   </p:sldIdLst>
   <p:sldSz cx="9144000" cy="6858000" type="screen4x3"/>
   <p:notesSz cx="6797675" cy="9926638"/>
   <p:custDataLst>
-    <p:tags r:id="rId26"/>
+    <p:tags r:id="rId27"/>
   </p:custDataLst>
   <p:defaultTextStyle>
     <a:defPPr>
@@ -186,6 +187,7 @@
             <p14:sldId id="335"/>
             <p14:sldId id="337"/>
             <p14:sldId id="336"/>
+            <p14:sldId id="698"/>
             <p14:sldId id="302"/>
             <p14:sldId id="324"/>
             <p14:sldId id="329"/>
@@ -2226,7 +2228,7 @@
               <a:pPr>
                 <a:defRPr/>
               </a:pPr>
-              <a:t>19</a:t>
+              <a:t>20</a:t>
             </a:fld>
             <a:endParaRPr lang="de-DE"/>
           </a:p>
@@ -2374,7 +2376,7 @@
               <a:pPr>
                 <a:defRPr/>
               </a:pPr>
-              <a:t>21</a:t>
+              <a:t>22</a:t>
             </a:fld>
             <a:endParaRPr lang="de-DE"/>
           </a:p>
@@ -2522,7 +2524,7 @@
               <a:pPr>
                 <a:defRPr/>
               </a:pPr>
-              <a:t>22</a:t>
+              <a:t>23</a:t>
             </a:fld>
             <a:endParaRPr lang="de-DE"/>
           </a:p>
@@ -10334,7 +10336,31 @@
             </a:r>
             <a:r>
               <a:rPr lang="de-DE" dirty="0"/>
-              <a:t> DOFs</a:t>
+              <a:t> DOFs  (</a:t>
+            </a:r>
+            <a:r>
+              <a:rPr lang="de-DE" dirty="0" err="1"/>
+              <a:t>Partially</a:t>
+            </a:r>
+            <a:r>
+              <a:rPr lang="de-DE" dirty="0"/>
+              <a:t> </a:t>
+            </a:r>
+            <a:r>
+              <a:rPr lang="de-DE" dirty="0" err="1"/>
+              <a:t>done</a:t>
+            </a:r>
+            <a:r>
+              <a:rPr lang="de-DE" dirty="0"/>
+              <a:t>, </a:t>
+            </a:r>
+            <a:r>
+              <a:rPr lang="de-DE" dirty="0" err="1"/>
+              <a:t>works</a:t>
+            </a:r>
+            <a:r>
+              <a:rPr lang="de-DE" dirty="0"/>
+              <a:t>)</a:t>
             </a:r>
           </a:p>
           <a:p>
@@ -10637,6 +10663,577 @@
           <p:cNvPr id="2" name="Titel 1">
             <a:extLst>
               <a:ext uri="{FF2B5EF4-FFF2-40B4-BE49-F238E27FC236}">
+                <a16:creationId xmlns:a16="http://schemas.microsoft.com/office/drawing/2014/main" id="{09F55D0F-7F7C-D14E-F97A-5DB7492B01E3}"/>
+              </a:ext>
+            </a:extLst>
+          </p:cNvPr>
+          <p:cNvSpPr>
+            <a:spLocks noGrp="1"/>
+          </p:cNvSpPr>
+          <p:nvPr>
+            <p:ph type="title"/>
+          </p:nvPr>
+        </p:nvSpPr>
+        <p:spPr/>
+        <p:txBody>
+          <a:bodyPr/>
+          <a:lstStyle/>
+          <a:p>
+            <a:r>
+              <a:rPr lang="de-DE" dirty="0" err="1"/>
+              <a:t>Only</a:t>
+            </a:r>
+            <a:r>
+              <a:rPr lang="de-DE" dirty="0"/>
+              <a:t> check </a:t>
+            </a:r>
+            <a:r>
+              <a:rPr lang="de-DE" dirty="0" err="1"/>
+              <a:t>some</a:t>
+            </a:r>
+            <a:r>
+              <a:rPr lang="de-DE" dirty="0"/>
+              <a:t> DOFs</a:t>
+            </a:r>
+          </a:p>
+        </p:txBody>
+      </p:sp>
+      <mc:AlternateContent xmlns:mc="http://schemas.openxmlformats.org/markup-compatibility/2006">
+        <mc:Choice xmlns:a14="http://schemas.microsoft.com/office/drawing/2010/main" Requires="a14">
+          <p:sp>
+            <p:nvSpPr>
+              <p:cNvPr id="3" name="Inhaltsplatzhalter 2">
+                <a:extLst>
+                  <a:ext uri="{FF2B5EF4-FFF2-40B4-BE49-F238E27FC236}">
+                    <a16:creationId xmlns:a16="http://schemas.microsoft.com/office/drawing/2014/main" id="{82CDB914-000D-2972-B336-1A534F3C8CB9}"/>
+                  </a:ext>
+                </a:extLst>
+              </p:cNvPr>
+              <p:cNvSpPr>
+                <a:spLocks noGrp="1"/>
+              </p:cNvSpPr>
+              <p:nvPr>
+                <p:ph idx="1"/>
+              </p:nvPr>
+            </p:nvSpPr>
+            <p:spPr/>
+            <p:txBody>
+              <a:bodyPr/>
+              <a:lstStyle/>
+              <a:p>
+                <a14:m>
+                  <m:oMath xmlns:m="http://schemas.openxmlformats.org/officeDocument/2006/math">
+                    <m:sSup>
+                      <m:sSupPr>
+                        <m:ctrlPr>
+                          <a:rPr lang="de-DE" b="0" i="1" smtClean="0">
+                            <a:latin typeface="Cambria Math" panose="02040503050406030204" pitchFamily="18" charset="0"/>
+                          </a:rPr>
+                        </m:ctrlPr>
+                      </m:sSupPr>
+                      <m:e>
+                        <m:r>
+                          <a:rPr lang="de-DE" b="0" i="1" smtClean="0">
+                            <a:latin typeface="Cambria Math" panose="02040503050406030204" pitchFamily="18" charset="0"/>
+                          </a:rPr>
+                          <m:t>𝑟</m:t>
+                        </m:r>
+                        <m:r>
+                          <a:rPr lang="de-DE" b="0" i="1" smtClean="0">
+                            <a:latin typeface="Cambria Math" panose="02040503050406030204" pitchFamily="18" charset="0"/>
+                          </a:rPr>
+                          <m:t>=</m:t>
+                        </m:r>
+                        <m:r>
+                          <a:rPr lang="de-DE" b="0" i="1" smtClean="0">
+                            <a:latin typeface="Cambria Math" panose="02040503050406030204" pitchFamily="18" charset="0"/>
+                          </a:rPr>
+                          <m:t>𝑈</m:t>
+                        </m:r>
+                      </m:e>
+                      <m:sup>
+                        <m:r>
+                          <a:rPr lang="de-DE" b="0" i="1" smtClean="0">
+                            <a:latin typeface="Cambria Math" panose="02040503050406030204" pitchFamily="18" charset="0"/>
+                          </a:rPr>
+                          <m:t>𝐻</m:t>
+                        </m:r>
+                      </m:sup>
+                    </m:sSup>
+                    <m:r>
+                      <a:rPr lang="de-DE" b="0" i="1" smtClean="0">
+                        <a:latin typeface="Cambria Math" panose="02040503050406030204" pitchFamily="18" charset="0"/>
+                      </a:rPr>
+                      <m:t>𝐴𝑈𝑥</m:t>
+                    </m:r>
+                    <m:r>
+                      <a:rPr lang="de-DE" b="0" i="1" smtClean="0">
+                        <a:latin typeface="Cambria Math" panose="02040503050406030204" pitchFamily="18" charset="0"/>
+                      </a:rPr>
+                      <m:t>−</m:t>
+                    </m:r>
+                    <m:sSup>
+                      <m:sSupPr>
+                        <m:ctrlPr>
+                          <a:rPr lang="de-DE" b="0" i="1" smtClean="0">
+                            <a:latin typeface="Cambria Math" panose="02040503050406030204" pitchFamily="18" charset="0"/>
+                          </a:rPr>
+                        </m:ctrlPr>
+                      </m:sSupPr>
+                      <m:e>
+                        <m:r>
+                          <a:rPr lang="de-DE" b="0" i="1" smtClean="0">
+                            <a:latin typeface="Cambria Math" panose="02040503050406030204" pitchFamily="18" charset="0"/>
+                          </a:rPr>
+                          <m:t>𝑈</m:t>
+                        </m:r>
+                      </m:e>
+                      <m:sup>
+                        <m:r>
+                          <a:rPr lang="de-DE" b="0" i="1" smtClean="0">
+                            <a:latin typeface="Cambria Math" panose="02040503050406030204" pitchFamily="18" charset="0"/>
+                          </a:rPr>
+                          <m:t>𝐻</m:t>
+                        </m:r>
+                      </m:sup>
+                    </m:sSup>
+                    <m:r>
+                      <a:rPr lang="de-DE" b="0" i="1" smtClean="0">
+                        <a:latin typeface="Cambria Math" panose="02040503050406030204" pitchFamily="18" charset="0"/>
+                      </a:rPr>
+                      <m:t>𝑏</m:t>
+                    </m:r>
+                  </m:oMath>
+                </a14:m>
+                <a:endParaRPr lang="de-DE" b="0" dirty="0"/>
+              </a:p>
+              <a:p>
+                <a14:m>
+                  <m:oMath xmlns:m="http://schemas.openxmlformats.org/officeDocument/2006/math">
+                    <m:r>
+                      <a:rPr lang="de-DE" b="0" i="1" smtClean="0">
+                        <a:latin typeface="Cambria Math" panose="02040503050406030204" pitchFamily="18" charset="0"/>
+                      </a:rPr>
+                      <m:t>𝑟</m:t>
+                    </m:r>
+                  </m:oMath>
+                </a14:m>
+                <a:r>
+                  <a:rPr lang="de-DE" dirty="0"/>
+                  <a:t> </a:t>
+                </a:r>
+                <a:r>
+                  <a:rPr lang="de-DE" dirty="0" err="1"/>
+                  <a:t>is</a:t>
+                </a:r>
+                <a:r>
+                  <a:rPr lang="de-DE" dirty="0"/>
+                  <a:t> not </a:t>
+                </a:r>
+                <a:r>
+                  <a:rPr lang="de-DE" dirty="0" err="1"/>
+                  <a:t>needed</a:t>
+                </a:r>
+                <a:r>
+                  <a:rPr lang="de-DE" dirty="0"/>
+                  <a:t> in </a:t>
+                </a:r>
+                <a:r>
+                  <a:rPr lang="de-DE" dirty="0" err="1"/>
+                  <a:t>each</a:t>
+                </a:r>
+                <a:r>
+                  <a:rPr lang="de-DE" dirty="0"/>
+                  <a:t> DOF, a </a:t>
+                </a:r>
+                <a:r>
+                  <a:rPr lang="de-DE" dirty="0" err="1"/>
+                  <a:t>selection</a:t>
+                </a:r>
+                <a:r>
+                  <a:rPr lang="de-DE" dirty="0"/>
+                  <a:t> </a:t>
+                </a:r>
+                <a:r>
+                  <a:rPr lang="de-DE" dirty="0" err="1"/>
+                  <a:t>may</a:t>
+                </a:r>
+                <a:r>
+                  <a:rPr lang="de-DE" dirty="0"/>
+                  <a:t> </a:t>
+                </a:r>
+                <a:r>
+                  <a:rPr lang="de-DE" dirty="0" err="1"/>
+                  <a:t>be</a:t>
+                </a:r>
+                <a:r>
+                  <a:rPr lang="de-DE" dirty="0"/>
+                  <a:t> </a:t>
+                </a:r>
+                <a:r>
+                  <a:rPr lang="de-DE" dirty="0" err="1"/>
+                  <a:t>enough</a:t>
+                </a:r>
+                <a:endParaRPr lang="de-DE" dirty="0"/>
+              </a:p>
+              <a:p>
+                <a14:m>
+                  <m:oMath xmlns:m="http://schemas.openxmlformats.org/officeDocument/2006/math">
+                    <m:r>
+                      <a:rPr lang="de-DE" i="1">
+                        <a:latin typeface="Cambria Math" panose="02040503050406030204" pitchFamily="18" charset="0"/>
+                      </a:rPr>
+                      <m:t>𝑟</m:t>
+                    </m:r>
+                  </m:oMath>
+                </a14:m>
+                <a:r>
+                  <a:rPr lang="de-DE" dirty="0"/>
+                  <a:t> </a:t>
+                </a:r>
+                <a:r>
+                  <a:rPr lang="de-DE" dirty="0" err="1"/>
+                  <a:t>is</a:t>
+                </a:r>
+                <a:r>
+                  <a:rPr lang="de-DE" dirty="0"/>
+                  <a:t> </a:t>
+                </a:r>
+                <a:r>
+                  <a:rPr lang="de-DE" dirty="0" err="1"/>
+                  <a:t>only</a:t>
+                </a:r>
+                <a:r>
+                  <a:rPr lang="de-DE" dirty="0"/>
+                  <a:t> </a:t>
+                </a:r>
+                <a:r>
+                  <a:rPr lang="de-DE" dirty="0" err="1"/>
+                  <a:t>needed</a:t>
+                </a:r>
+                <a:r>
+                  <a:rPr lang="de-DE" dirty="0"/>
+                  <a:t> on </a:t>
+                </a:r>
+                <a:r>
+                  <a:rPr lang="de-DE" dirty="0" err="1"/>
+                  <a:t>the</a:t>
+                </a:r>
+                <a:r>
+                  <a:rPr lang="de-DE" dirty="0"/>
+                  <a:t> beam </a:t>
+                </a:r>
+                <a:r>
+                  <a:rPr lang="de-DE" dirty="0" err="1"/>
+                  <a:t>if</a:t>
+                </a:r>
+                <a:r>
+                  <a:rPr lang="de-DE" dirty="0"/>
+                  <a:t> just </a:t>
+                </a:r>
+                <a:r>
+                  <a:rPr lang="de-DE" dirty="0" err="1"/>
+                  <a:t>the</a:t>
+                </a:r>
+                <a:r>
+                  <a:rPr lang="de-DE" dirty="0"/>
+                  <a:t> </a:t>
+                </a:r>
+                <a:r>
+                  <a:rPr lang="de-DE" dirty="0" err="1"/>
+                  <a:t>impedance</a:t>
+                </a:r>
+                <a:r>
+                  <a:rPr lang="de-DE" dirty="0"/>
+                  <a:t> </a:t>
+                </a:r>
+                <a:r>
+                  <a:rPr lang="de-DE" dirty="0" err="1"/>
+                  <a:t>is</a:t>
+                </a:r>
+                <a:r>
+                  <a:rPr lang="de-DE" dirty="0"/>
+                  <a:t> </a:t>
+                </a:r>
+                <a:r>
+                  <a:rPr lang="de-DE" dirty="0" err="1"/>
+                  <a:t>calculated</a:t>
+                </a:r>
+                <a:r>
+                  <a:rPr lang="de-DE" dirty="0"/>
+                  <a:t>, and just on </a:t>
+                </a:r>
+                <a:r>
+                  <a:rPr lang="de-DE" dirty="0" err="1"/>
+                  <a:t>the</a:t>
+                </a:r>
+                <a:r>
+                  <a:rPr lang="de-DE" dirty="0"/>
+                  <a:t> </a:t>
+                </a:r>
+                <a:r>
+                  <a:rPr lang="de-DE" dirty="0" err="1"/>
+                  <a:t>ports</a:t>
+                </a:r>
+                <a:r>
+                  <a:rPr lang="de-DE" dirty="0"/>
+                  <a:t> </a:t>
+                </a:r>
+                <a:r>
+                  <a:rPr lang="de-DE" dirty="0" err="1"/>
+                  <a:t>if</a:t>
+                </a:r>
+                <a:r>
+                  <a:rPr lang="de-DE" dirty="0"/>
+                  <a:t> S-parameters </a:t>
+                </a:r>
+                <a:r>
+                  <a:rPr lang="de-DE" dirty="0" err="1"/>
+                  <a:t>are</a:t>
+                </a:r>
+                <a:r>
+                  <a:rPr lang="de-DE" dirty="0"/>
+                  <a:t> </a:t>
+                </a:r>
+                <a:r>
+                  <a:rPr lang="de-DE" dirty="0" err="1"/>
+                  <a:t>calculated</a:t>
+                </a:r>
+                <a:endParaRPr lang="de-DE" dirty="0"/>
+              </a:p>
+              <a:p>
+                <a:r>
+                  <a:rPr lang="de-DE" dirty="0"/>
+                  <a:t>This </a:t>
+                </a:r>
+                <a:r>
+                  <a:rPr lang="de-DE" dirty="0" err="1"/>
+                  <a:t>requires</a:t>
+                </a:r>
+                <a:r>
+                  <a:rPr lang="de-DE" dirty="0"/>
+                  <a:t> an a posteriori </a:t>
+                </a:r>
+                <a:r>
+                  <a:rPr lang="de-DE" dirty="0" err="1"/>
+                  <a:t>error</a:t>
+                </a:r>
+                <a:r>
+                  <a:rPr lang="de-DE" dirty="0"/>
+                  <a:t> </a:t>
+                </a:r>
+                <a:r>
+                  <a:rPr lang="de-DE" dirty="0" err="1"/>
+                  <a:t>metric</a:t>
+                </a:r>
+                <a:r>
+                  <a:rPr lang="de-DE" dirty="0"/>
+                  <a:t> </a:t>
+                </a:r>
+                <a:r>
+                  <a:rPr lang="de-DE" dirty="0" err="1"/>
+                  <a:t>based</a:t>
+                </a:r>
+                <a:r>
+                  <a:rPr lang="de-DE" dirty="0"/>
+                  <a:t> on </a:t>
+                </a:r>
+                <a:r>
+                  <a:rPr lang="de-DE" dirty="0" err="1"/>
+                  <a:t>the</a:t>
+                </a:r>
+                <a:r>
+                  <a:rPr lang="de-DE" dirty="0"/>
+                  <a:t> </a:t>
+                </a:r>
+                <a:r>
+                  <a:rPr lang="de-DE" dirty="0" err="1"/>
+                  <a:t>impedance</a:t>
+                </a:r>
+                <a:r>
+                  <a:rPr lang="de-DE" dirty="0"/>
+                  <a:t>, not </a:t>
+                </a:r>
+                <a:r>
+                  <a:rPr lang="de-DE" dirty="0" err="1"/>
+                  <a:t>the</a:t>
+                </a:r>
+                <a:r>
+                  <a:rPr lang="de-DE" dirty="0"/>
+                  <a:t> </a:t>
+                </a:r>
+                <a:r>
+                  <a:rPr lang="de-DE"/>
+                  <a:t>field</a:t>
+                </a:r>
+                <a:endParaRPr lang="de-DE" dirty="0"/>
+              </a:p>
+            </p:txBody>
+          </p:sp>
+        </mc:Choice>
+        <mc:Fallback>
+          <p:sp>
+            <p:nvSpPr>
+              <p:cNvPr id="3" name="Inhaltsplatzhalter 2">
+                <a:extLst>
+                  <a:ext uri="{FF2B5EF4-FFF2-40B4-BE49-F238E27FC236}">
+                    <a16:creationId xmlns:a16="http://schemas.microsoft.com/office/drawing/2014/main" id="{82CDB914-000D-2972-B336-1A534F3C8CB9}"/>
+                  </a:ext>
+                </a:extLst>
+              </p:cNvPr>
+              <p:cNvSpPr>
+                <a:spLocks noGrp="1" noRot="1" noChangeAspect="1" noMove="1" noResize="1" noEditPoints="1" noAdjustHandles="1" noChangeArrowheads="1" noChangeShapeType="1" noTextEdit="1"/>
+              </p:cNvSpPr>
+              <p:nvPr>
+                <p:ph idx="1"/>
+              </p:nvPr>
+            </p:nvSpPr>
+            <p:spPr>
+              <a:blipFill>
+                <a:blip r:embed="rId2"/>
+                <a:stretch>
+                  <a:fillRect l="-917" t="-382"/>
+                </a:stretch>
+              </a:blipFill>
+            </p:spPr>
+            <p:txBody>
+              <a:bodyPr/>
+              <a:lstStyle/>
+              <a:p>
+                <a:r>
+                  <a:rPr lang="de-DE">
+                    <a:noFill/>
+                  </a:rPr>
+                  <a:t> </a:t>
+                </a:r>
+              </a:p>
+            </p:txBody>
+          </p:sp>
+        </mc:Fallback>
+      </mc:AlternateContent>
+      <p:sp>
+        <p:nvSpPr>
+          <p:cNvPr id="4" name="Foliennummernplatzhalter 3">
+            <a:extLst>
+              <a:ext uri="{FF2B5EF4-FFF2-40B4-BE49-F238E27FC236}">
+                <a16:creationId xmlns:a16="http://schemas.microsoft.com/office/drawing/2014/main" id="{50BAB88A-89DA-2549-436F-CAAB5DE1FA0B}"/>
+              </a:ext>
+            </a:extLst>
+          </p:cNvPr>
+          <p:cNvSpPr>
+            <a:spLocks noGrp="1"/>
+          </p:cNvSpPr>
+          <p:nvPr>
+            <p:ph type="sldNum" sz="quarter" idx="4"/>
+          </p:nvPr>
+        </p:nvSpPr>
+        <p:spPr/>
+        <p:txBody>
+          <a:bodyPr/>
+          <a:lstStyle/>
+          <a:p>
+            <a:fld id="{429C9586-58E4-4FC0-AB55-F3088F3AED5E}" type="slidenum">
+              <a:rPr lang="de-DE" smtClean="0"/>
+              <a:pPr/>
+              <a:t>18</a:t>
+            </a:fld>
+            <a:endParaRPr lang="de-DE" dirty="0"/>
+          </a:p>
+        </p:txBody>
+      </p:sp>
+      <p:sp>
+        <p:nvSpPr>
+          <p:cNvPr id="5" name="Fußzeilenplatzhalter 4">
+            <a:extLst>
+              <a:ext uri="{FF2B5EF4-FFF2-40B4-BE49-F238E27FC236}">
+                <a16:creationId xmlns:a16="http://schemas.microsoft.com/office/drawing/2014/main" id="{5CBD2DD5-1E6C-FD4A-AAC7-95C6B331D978}"/>
+              </a:ext>
+            </a:extLst>
+          </p:cNvPr>
+          <p:cNvSpPr>
+            <a:spLocks noGrp="1"/>
+          </p:cNvSpPr>
+          <p:nvPr>
+            <p:ph type="ftr" sz="quarter" idx="3"/>
+          </p:nvPr>
+        </p:nvSpPr>
+        <p:spPr/>
+        <p:txBody>
+          <a:bodyPr/>
+          <a:lstStyle/>
+          <a:p>
+            <a:r>
+              <a:rPr lang="en-US"/>
+              <a:t>TU Darmstadt | Institut für Teilchenbeschleunigung und Elektromagnetische Felder (TEMF) | Frederik Quetscher</a:t>
+            </a:r>
+            <a:endParaRPr lang="en-US" dirty="0"/>
+          </a:p>
+        </p:txBody>
+      </p:sp>
+      <p:sp>
+        <p:nvSpPr>
+          <p:cNvPr id="6" name="Datumsplatzhalter 5">
+            <a:extLst>
+              <a:ext uri="{FF2B5EF4-FFF2-40B4-BE49-F238E27FC236}">
+                <a16:creationId xmlns:a16="http://schemas.microsoft.com/office/drawing/2014/main" id="{2764C873-D4E5-10FE-5D52-D2CEE213480F}"/>
+              </a:ext>
+            </a:extLst>
+          </p:cNvPr>
+          <p:cNvSpPr>
+            <a:spLocks noGrp="1"/>
+          </p:cNvSpPr>
+          <p:nvPr>
+            <p:ph type="dt" sz="half" idx="2"/>
+          </p:nvPr>
+        </p:nvSpPr>
+        <p:spPr/>
+        <p:txBody>
+          <a:bodyPr/>
+          <a:lstStyle/>
+          <a:p>
+            <a:r>
+              <a:rPr lang="de-DE"/>
+              <a:t>25.01.2023</a:t>
+            </a:r>
+            <a:endParaRPr lang="de-DE" dirty="0"/>
+          </a:p>
+        </p:txBody>
+      </p:sp>
+    </p:spTree>
+    <p:extLst>
+      <p:ext uri="{BB962C8B-B14F-4D97-AF65-F5344CB8AC3E}">
+        <p14:creationId xmlns:p14="http://schemas.microsoft.com/office/powerpoint/2010/main" val="4231659805"/>
+      </p:ext>
+    </p:extLst>
+  </p:cSld>
+  <p:clrMapOvr>
+    <a:masterClrMapping/>
+  </p:clrMapOvr>
+</p:sld>
+</file>
+
+<file path=ppt/slides/slide19.xml><?xml version="1.0" encoding="utf-8"?>
+<p:sld xmlns:a="http://schemas.openxmlformats.org/drawingml/2006/main" xmlns:r="http://schemas.openxmlformats.org/officeDocument/2006/relationships" xmlns:p="http://schemas.openxmlformats.org/presentationml/2006/main">
+  <p:cSld>
+    <p:spTree>
+      <p:nvGrpSpPr>
+        <p:cNvPr id="1" name=""/>
+        <p:cNvGrpSpPr/>
+        <p:nvPr/>
+      </p:nvGrpSpPr>
+      <p:grpSpPr>
+        <a:xfrm>
+          <a:off x="0" y="0"/>
+          <a:ext cx="0" cy="0"/>
+          <a:chOff x="0" y="0"/>
+          <a:chExt cx="0" cy="0"/>
+        </a:xfrm>
+      </p:grpSpPr>
+      <p:sp>
+        <p:nvSpPr>
+          <p:cNvPr id="2" name="Titel 1">
+            <a:extLst>
+              <a:ext uri="{FF2B5EF4-FFF2-40B4-BE49-F238E27FC236}">
                 <a16:creationId xmlns:a16="http://schemas.microsoft.com/office/drawing/2014/main" id="{F763938D-89CC-19B1-6554-88343BCBD327}"/>
               </a:ext>
             </a:extLst>
@@ -10706,7 +11303,7 @@
             <a:fld id="{429C9586-58E4-4FC0-AB55-F3088F3AED5E}" type="slidenum">
               <a:rPr lang="de-DE" smtClean="0"/>
               <a:pPr/>
-              <a:t>18</a:t>
+              <a:t>19</a:t>
             </a:fld>
             <a:endParaRPr lang="de-DE" dirty="0"/>
           </a:p>
@@ -10828,273 +11425,6 @@
     <p:extLst>
       <p:ext uri="{BB962C8B-B14F-4D97-AF65-F5344CB8AC3E}">
         <p14:creationId xmlns:p14="http://schemas.microsoft.com/office/powerpoint/2010/main" val="754888177"/>
-      </p:ext>
-    </p:extLst>
-  </p:cSld>
-  <p:clrMapOvr>
-    <a:masterClrMapping/>
-  </p:clrMapOvr>
-</p:sld>
-</file>
-
-<file path=ppt/slides/slide19.xml><?xml version="1.0" encoding="utf-8"?>
-<p:sld xmlns:a="http://schemas.openxmlformats.org/drawingml/2006/main" xmlns:r="http://schemas.openxmlformats.org/officeDocument/2006/relationships" xmlns:p="http://schemas.openxmlformats.org/presentationml/2006/main" show="0">
-  <p:cSld>
-    <p:spTree>
-      <p:nvGrpSpPr>
-        <p:cNvPr id="1" name=""/>
-        <p:cNvGrpSpPr/>
-        <p:nvPr/>
-      </p:nvGrpSpPr>
-      <p:grpSpPr>
-        <a:xfrm>
-          <a:off x="0" y="0"/>
-          <a:ext cx="0" cy="0"/>
-          <a:chOff x="0" y="0"/>
-          <a:chExt cx="0" cy="0"/>
-        </a:xfrm>
-      </p:grpSpPr>
-      <p:pic>
-        <p:nvPicPr>
-          <p:cNvPr id="18" name="Grafik 17">
-            <a:extLst>
-              <a:ext uri="{FF2B5EF4-FFF2-40B4-BE49-F238E27FC236}">
-                <a16:creationId xmlns:a16="http://schemas.microsoft.com/office/drawing/2014/main" id="{D7500679-A26D-DAE3-E712-539E175378B9}"/>
-              </a:ext>
-            </a:extLst>
-          </p:cNvPr>
-          <p:cNvPicPr>
-            <a:picLocks noChangeAspect="1"/>
-          </p:cNvPicPr>
-          <p:nvPr/>
-        </p:nvPicPr>
-        <p:blipFill>
-          <a:blip r:embed="rId3" cstate="print">
-            <a:extLst>
-              <a:ext uri="{28A0092B-C50C-407E-A947-70E740481C1C}">
-                <a14:useLocalDpi xmlns:a14="http://schemas.microsoft.com/office/drawing/2010/main" val="0"/>
-              </a:ext>
-            </a:extLst>
-          </a:blip>
-          <a:stretch>
-            <a:fillRect/>
-          </a:stretch>
-        </p:blipFill>
-        <p:spPr>
-          <a:xfrm>
-            <a:off x="810090" y="3526174"/>
-            <a:ext cx="7866366" cy="2949888"/>
-          </a:xfrm>
-          <a:prstGeom prst="rect">
-            <a:avLst/>
-          </a:prstGeom>
-        </p:spPr>
-      </p:pic>
-      <p:sp>
-        <p:nvSpPr>
-          <p:cNvPr id="2" name="Titel 1">
-            <a:extLst>
-              <a:ext uri="{FF2B5EF4-FFF2-40B4-BE49-F238E27FC236}">
-                <a16:creationId xmlns:a16="http://schemas.microsoft.com/office/drawing/2014/main" id="{07080679-BD84-B529-0A15-B98EC5F14C92}"/>
-              </a:ext>
-            </a:extLst>
-          </p:cNvPr>
-          <p:cNvSpPr>
-            <a:spLocks noGrp="1"/>
-          </p:cNvSpPr>
-          <p:nvPr>
-            <p:ph type="title"/>
-          </p:nvPr>
-        </p:nvSpPr>
-        <p:spPr/>
-        <p:txBody>
-          <a:bodyPr/>
-          <a:lstStyle/>
-          <a:p>
-            <a:r>
-              <a:rPr lang="de-DE" dirty="0" err="1"/>
-              <a:t>Results</a:t>
-            </a:r>
-            <a:r>
-              <a:rPr lang="de-DE" dirty="0"/>
-              <a:t> - </a:t>
-            </a:r>
-            <a:r>
-              <a:rPr lang="de-DE" dirty="0" err="1"/>
-              <a:t>Constriction</a:t>
-            </a:r>
-            <a:endParaRPr lang="de-DE" dirty="0"/>
-          </a:p>
-        </p:txBody>
-      </p:sp>
-      <p:sp>
-        <p:nvSpPr>
-          <p:cNvPr id="4" name="Foliennummernplatzhalter 3">
-            <a:extLst>
-              <a:ext uri="{FF2B5EF4-FFF2-40B4-BE49-F238E27FC236}">
-                <a16:creationId xmlns:a16="http://schemas.microsoft.com/office/drawing/2014/main" id="{043E8030-0C5E-2FE1-A642-2B202110315C}"/>
-              </a:ext>
-            </a:extLst>
-          </p:cNvPr>
-          <p:cNvSpPr>
-            <a:spLocks noGrp="1"/>
-          </p:cNvSpPr>
-          <p:nvPr>
-            <p:ph type="sldNum" sz="quarter" idx="4"/>
-          </p:nvPr>
-        </p:nvSpPr>
-        <p:spPr/>
-        <p:txBody>
-          <a:bodyPr/>
-          <a:lstStyle/>
-          <a:p>
-            <a:fld id="{429C9586-58E4-4FC0-AB55-F3088F3AED5E}" type="slidenum">
-              <a:rPr lang="de-DE" smtClean="0"/>
-              <a:pPr/>
-              <a:t>19</a:t>
-            </a:fld>
-            <a:endParaRPr lang="de-DE" dirty="0"/>
-          </a:p>
-        </p:txBody>
-      </p:sp>
-      <p:sp>
-        <p:nvSpPr>
-          <p:cNvPr id="5" name="Fußzeilenplatzhalter 4">
-            <a:extLst>
-              <a:ext uri="{FF2B5EF4-FFF2-40B4-BE49-F238E27FC236}">
-                <a16:creationId xmlns:a16="http://schemas.microsoft.com/office/drawing/2014/main" id="{CDA1D5BE-A18C-8529-13E9-8A7AB1AF115C}"/>
-              </a:ext>
-            </a:extLst>
-          </p:cNvPr>
-          <p:cNvSpPr>
-            <a:spLocks noGrp="1"/>
-          </p:cNvSpPr>
-          <p:nvPr>
-            <p:ph type="ftr" sz="quarter" idx="3"/>
-          </p:nvPr>
-        </p:nvSpPr>
-        <p:spPr/>
-        <p:txBody>
-          <a:bodyPr/>
-          <a:lstStyle/>
-          <a:p>
-            <a:r>
-              <a:rPr lang="en-US"/>
-              <a:t>TU Darmstadt | Institut für Teilchenbeschleunigung und Elektromagnetische Felder (TEMF) | Frederik Quetscher</a:t>
-            </a:r>
-            <a:endParaRPr lang="en-US" dirty="0"/>
-          </a:p>
-        </p:txBody>
-      </p:sp>
-      <p:sp>
-        <p:nvSpPr>
-          <p:cNvPr id="6" name="Datumsplatzhalter 5">
-            <a:extLst>
-              <a:ext uri="{FF2B5EF4-FFF2-40B4-BE49-F238E27FC236}">
-                <a16:creationId xmlns:a16="http://schemas.microsoft.com/office/drawing/2014/main" id="{4C7C9944-DC49-8066-1C85-B642DD74EBA1}"/>
-              </a:ext>
-            </a:extLst>
-          </p:cNvPr>
-          <p:cNvSpPr>
-            <a:spLocks noGrp="1"/>
-          </p:cNvSpPr>
-          <p:nvPr>
-            <p:ph type="dt" sz="half" idx="2"/>
-          </p:nvPr>
-        </p:nvSpPr>
-        <p:spPr/>
-        <p:txBody>
-          <a:bodyPr/>
-          <a:lstStyle/>
-          <a:p>
-            <a:r>
-              <a:rPr lang="de-DE"/>
-              <a:t>22.9.2022</a:t>
-            </a:r>
-            <a:endParaRPr lang="de-DE" dirty="0"/>
-          </a:p>
-        </p:txBody>
-      </p:sp>
-      <p:pic>
-        <p:nvPicPr>
-          <p:cNvPr id="8" name="Grafik 7">
-            <a:extLst>
-              <a:ext uri="{FF2B5EF4-FFF2-40B4-BE49-F238E27FC236}">
-                <a16:creationId xmlns:a16="http://schemas.microsoft.com/office/drawing/2014/main" id="{D12E7920-C9D8-C6D3-EC73-B3AD0924B8C2}"/>
-              </a:ext>
-            </a:extLst>
-          </p:cNvPr>
-          <p:cNvPicPr>
-            <a:picLocks noChangeAspect="1"/>
-          </p:cNvPicPr>
-          <p:nvPr/>
-        </p:nvPicPr>
-        <p:blipFill>
-          <a:blip r:embed="rId4" cstate="print">
-            <a:extLst>
-              <a:ext uri="{28A0092B-C50C-407E-A947-70E740481C1C}">
-                <a14:useLocalDpi xmlns:a14="http://schemas.microsoft.com/office/drawing/2010/main" val="0"/>
-              </a:ext>
-            </a:extLst>
-          </a:blip>
-          <a:stretch>
-            <a:fillRect/>
-          </a:stretch>
-        </p:blipFill>
-        <p:spPr>
-          <a:xfrm rot="5400000">
-            <a:off x="1104701" y="1258883"/>
-            <a:ext cx="1965008" cy="2519242"/>
-          </a:xfrm>
-          <a:prstGeom prst="rect">
-            <a:avLst/>
-          </a:prstGeom>
-        </p:spPr>
-      </p:pic>
-      <p:pic>
-        <p:nvPicPr>
-          <p:cNvPr id="16" name="Grafik 15">
-            <a:extLst>
-              <a:ext uri="{FF2B5EF4-FFF2-40B4-BE49-F238E27FC236}">
-                <a16:creationId xmlns:a16="http://schemas.microsoft.com/office/drawing/2014/main" id="{14105B4A-0DE2-038C-BE00-3DBB6AB073B8}"/>
-              </a:ext>
-            </a:extLst>
-          </p:cNvPr>
-          <p:cNvPicPr>
-            <a:picLocks noChangeAspect="1"/>
-          </p:cNvPicPr>
-          <p:nvPr/>
-        </p:nvPicPr>
-        <p:blipFill>
-          <a:blip r:embed="rId5" cstate="print">
-            <a:extLst>
-              <a:ext uri="{28A0092B-C50C-407E-A947-70E740481C1C}">
-                <a14:useLocalDpi xmlns:a14="http://schemas.microsoft.com/office/drawing/2010/main" val="0"/>
-              </a:ext>
-            </a:extLst>
-          </a:blip>
-          <a:srcRect/>
-          <a:stretch/>
-        </p:blipFill>
-        <p:spPr>
-          <a:xfrm>
-            <a:off x="4032697" y="1520788"/>
-            <a:ext cx="4752528" cy="2376264"/>
-          </a:xfrm>
-          <a:prstGeom prst="rect">
-            <a:avLst/>
-          </a:prstGeom>
-          <a:ln w="15875">
-            <a:solidFill>
-              <a:schemeClr val="tx1"/>
-            </a:solidFill>
-          </a:ln>
-        </p:spPr>
-      </p:pic>
-    </p:spTree>
-    <p:extLst>
-      <p:ext uri="{BB962C8B-B14F-4D97-AF65-F5344CB8AC3E}">
-        <p14:creationId xmlns:p14="http://schemas.microsoft.com/office/powerpoint/2010/main" val="4220527179"/>
       </p:ext>
     </p:extLst>
   </p:cSld>
@@ -13639,6 +13969,273 @@
           <a:chExt cx="0" cy="0"/>
         </a:xfrm>
       </p:grpSpPr>
+      <p:pic>
+        <p:nvPicPr>
+          <p:cNvPr id="18" name="Grafik 17">
+            <a:extLst>
+              <a:ext uri="{FF2B5EF4-FFF2-40B4-BE49-F238E27FC236}">
+                <a16:creationId xmlns:a16="http://schemas.microsoft.com/office/drawing/2014/main" id="{D7500679-A26D-DAE3-E712-539E175378B9}"/>
+              </a:ext>
+            </a:extLst>
+          </p:cNvPr>
+          <p:cNvPicPr>
+            <a:picLocks noChangeAspect="1"/>
+          </p:cNvPicPr>
+          <p:nvPr/>
+        </p:nvPicPr>
+        <p:blipFill>
+          <a:blip r:embed="rId3" cstate="print">
+            <a:extLst>
+              <a:ext uri="{28A0092B-C50C-407E-A947-70E740481C1C}">
+                <a14:useLocalDpi xmlns:a14="http://schemas.microsoft.com/office/drawing/2010/main" val="0"/>
+              </a:ext>
+            </a:extLst>
+          </a:blip>
+          <a:stretch>
+            <a:fillRect/>
+          </a:stretch>
+        </p:blipFill>
+        <p:spPr>
+          <a:xfrm>
+            <a:off x="810090" y="3526174"/>
+            <a:ext cx="7866366" cy="2949888"/>
+          </a:xfrm>
+          <a:prstGeom prst="rect">
+            <a:avLst/>
+          </a:prstGeom>
+        </p:spPr>
+      </p:pic>
+      <p:sp>
+        <p:nvSpPr>
+          <p:cNvPr id="2" name="Titel 1">
+            <a:extLst>
+              <a:ext uri="{FF2B5EF4-FFF2-40B4-BE49-F238E27FC236}">
+                <a16:creationId xmlns:a16="http://schemas.microsoft.com/office/drawing/2014/main" id="{07080679-BD84-B529-0A15-B98EC5F14C92}"/>
+              </a:ext>
+            </a:extLst>
+          </p:cNvPr>
+          <p:cNvSpPr>
+            <a:spLocks noGrp="1"/>
+          </p:cNvSpPr>
+          <p:nvPr>
+            <p:ph type="title"/>
+          </p:nvPr>
+        </p:nvSpPr>
+        <p:spPr/>
+        <p:txBody>
+          <a:bodyPr/>
+          <a:lstStyle/>
+          <a:p>
+            <a:r>
+              <a:rPr lang="de-DE" dirty="0" err="1"/>
+              <a:t>Results</a:t>
+            </a:r>
+            <a:r>
+              <a:rPr lang="de-DE" dirty="0"/>
+              <a:t> - </a:t>
+            </a:r>
+            <a:r>
+              <a:rPr lang="de-DE" dirty="0" err="1"/>
+              <a:t>Constriction</a:t>
+            </a:r>
+            <a:endParaRPr lang="de-DE" dirty="0"/>
+          </a:p>
+        </p:txBody>
+      </p:sp>
+      <p:sp>
+        <p:nvSpPr>
+          <p:cNvPr id="4" name="Foliennummernplatzhalter 3">
+            <a:extLst>
+              <a:ext uri="{FF2B5EF4-FFF2-40B4-BE49-F238E27FC236}">
+                <a16:creationId xmlns:a16="http://schemas.microsoft.com/office/drawing/2014/main" id="{043E8030-0C5E-2FE1-A642-2B202110315C}"/>
+              </a:ext>
+            </a:extLst>
+          </p:cNvPr>
+          <p:cNvSpPr>
+            <a:spLocks noGrp="1"/>
+          </p:cNvSpPr>
+          <p:nvPr>
+            <p:ph type="sldNum" sz="quarter" idx="4"/>
+          </p:nvPr>
+        </p:nvSpPr>
+        <p:spPr/>
+        <p:txBody>
+          <a:bodyPr/>
+          <a:lstStyle/>
+          <a:p>
+            <a:fld id="{429C9586-58E4-4FC0-AB55-F3088F3AED5E}" type="slidenum">
+              <a:rPr lang="de-DE" smtClean="0"/>
+              <a:pPr/>
+              <a:t>20</a:t>
+            </a:fld>
+            <a:endParaRPr lang="de-DE" dirty="0"/>
+          </a:p>
+        </p:txBody>
+      </p:sp>
+      <p:sp>
+        <p:nvSpPr>
+          <p:cNvPr id="5" name="Fußzeilenplatzhalter 4">
+            <a:extLst>
+              <a:ext uri="{FF2B5EF4-FFF2-40B4-BE49-F238E27FC236}">
+                <a16:creationId xmlns:a16="http://schemas.microsoft.com/office/drawing/2014/main" id="{CDA1D5BE-A18C-8529-13E9-8A7AB1AF115C}"/>
+              </a:ext>
+            </a:extLst>
+          </p:cNvPr>
+          <p:cNvSpPr>
+            <a:spLocks noGrp="1"/>
+          </p:cNvSpPr>
+          <p:nvPr>
+            <p:ph type="ftr" sz="quarter" idx="3"/>
+          </p:nvPr>
+        </p:nvSpPr>
+        <p:spPr/>
+        <p:txBody>
+          <a:bodyPr/>
+          <a:lstStyle/>
+          <a:p>
+            <a:r>
+              <a:rPr lang="en-US"/>
+              <a:t>TU Darmstadt | Institut für Teilchenbeschleunigung und Elektromagnetische Felder (TEMF) | Frederik Quetscher</a:t>
+            </a:r>
+            <a:endParaRPr lang="en-US" dirty="0"/>
+          </a:p>
+        </p:txBody>
+      </p:sp>
+      <p:sp>
+        <p:nvSpPr>
+          <p:cNvPr id="6" name="Datumsplatzhalter 5">
+            <a:extLst>
+              <a:ext uri="{FF2B5EF4-FFF2-40B4-BE49-F238E27FC236}">
+                <a16:creationId xmlns:a16="http://schemas.microsoft.com/office/drawing/2014/main" id="{4C7C9944-DC49-8066-1C85-B642DD74EBA1}"/>
+              </a:ext>
+            </a:extLst>
+          </p:cNvPr>
+          <p:cNvSpPr>
+            <a:spLocks noGrp="1"/>
+          </p:cNvSpPr>
+          <p:nvPr>
+            <p:ph type="dt" sz="half" idx="2"/>
+          </p:nvPr>
+        </p:nvSpPr>
+        <p:spPr/>
+        <p:txBody>
+          <a:bodyPr/>
+          <a:lstStyle/>
+          <a:p>
+            <a:r>
+              <a:rPr lang="de-DE"/>
+              <a:t>22.9.2022</a:t>
+            </a:r>
+            <a:endParaRPr lang="de-DE" dirty="0"/>
+          </a:p>
+        </p:txBody>
+      </p:sp>
+      <p:pic>
+        <p:nvPicPr>
+          <p:cNvPr id="8" name="Grafik 7">
+            <a:extLst>
+              <a:ext uri="{FF2B5EF4-FFF2-40B4-BE49-F238E27FC236}">
+                <a16:creationId xmlns:a16="http://schemas.microsoft.com/office/drawing/2014/main" id="{D12E7920-C9D8-C6D3-EC73-B3AD0924B8C2}"/>
+              </a:ext>
+            </a:extLst>
+          </p:cNvPr>
+          <p:cNvPicPr>
+            <a:picLocks noChangeAspect="1"/>
+          </p:cNvPicPr>
+          <p:nvPr/>
+        </p:nvPicPr>
+        <p:blipFill>
+          <a:blip r:embed="rId4" cstate="print">
+            <a:extLst>
+              <a:ext uri="{28A0092B-C50C-407E-A947-70E740481C1C}">
+                <a14:useLocalDpi xmlns:a14="http://schemas.microsoft.com/office/drawing/2010/main" val="0"/>
+              </a:ext>
+            </a:extLst>
+          </a:blip>
+          <a:stretch>
+            <a:fillRect/>
+          </a:stretch>
+        </p:blipFill>
+        <p:spPr>
+          <a:xfrm rot="5400000">
+            <a:off x="1104701" y="1258883"/>
+            <a:ext cx="1965008" cy="2519242"/>
+          </a:xfrm>
+          <a:prstGeom prst="rect">
+            <a:avLst/>
+          </a:prstGeom>
+        </p:spPr>
+      </p:pic>
+      <p:pic>
+        <p:nvPicPr>
+          <p:cNvPr id="16" name="Grafik 15">
+            <a:extLst>
+              <a:ext uri="{FF2B5EF4-FFF2-40B4-BE49-F238E27FC236}">
+                <a16:creationId xmlns:a16="http://schemas.microsoft.com/office/drawing/2014/main" id="{14105B4A-0DE2-038C-BE00-3DBB6AB073B8}"/>
+              </a:ext>
+            </a:extLst>
+          </p:cNvPr>
+          <p:cNvPicPr>
+            <a:picLocks noChangeAspect="1"/>
+          </p:cNvPicPr>
+          <p:nvPr/>
+        </p:nvPicPr>
+        <p:blipFill>
+          <a:blip r:embed="rId5" cstate="print">
+            <a:extLst>
+              <a:ext uri="{28A0092B-C50C-407E-A947-70E740481C1C}">
+                <a14:useLocalDpi xmlns:a14="http://schemas.microsoft.com/office/drawing/2010/main" val="0"/>
+              </a:ext>
+            </a:extLst>
+          </a:blip>
+          <a:srcRect/>
+          <a:stretch/>
+        </p:blipFill>
+        <p:spPr>
+          <a:xfrm>
+            <a:off x="4032697" y="1520788"/>
+            <a:ext cx="4752528" cy="2376264"/>
+          </a:xfrm>
+          <a:prstGeom prst="rect">
+            <a:avLst/>
+          </a:prstGeom>
+          <a:ln w="15875">
+            <a:solidFill>
+              <a:schemeClr val="tx1"/>
+            </a:solidFill>
+          </a:ln>
+        </p:spPr>
+      </p:pic>
+    </p:spTree>
+    <p:extLst>
+      <p:ext uri="{BB962C8B-B14F-4D97-AF65-F5344CB8AC3E}">
+        <p14:creationId xmlns:p14="http://schemas.microsoft.com/office/powerpoint/2010/main" val="4220527179"/>
+      </p:ext>
+    </p:extLst>
+  </p:cSld>
+  <p:clrMapOvr>
+    <a:masterClrMapping/>
+  </p:clrMapOvr>
+</p:sld>
+</file>
+
+<file path=ppt/slides/slide21.xml><?xml version="1.0" encoding="utf-8"?>
+<p:sld xmlns:a="http://schemas.openxmlformats.org/drawingml/2006/main" xmlns:r="http://schemas.openxmlformats.org/officeDocument/2006/relationships" xmlns:p="http://schemas.openxmlformats.org/presentationml/2006/main" show="0">
+  <p:cSld>
+    <p:spTree>
+      <p:nvGrpSpPr>
+        <p:cNvPr id="1" name=""/>
+        <p:cNvGrpSpPr/>
+        <p:nvPr/>
+      </p:nvGrpSpPr>
+      <p:grpSpPr>
+        <a:xfrm>
+          <a:off x="0" y="0"/>
+          <a:ext cx="0" cy="0"/>
+          <a:chOff x="0" y="0"/>
+          <a:chExt cx="0" cy="0"/>
+        </a:xfrm>
+      </p:grpSpPr>
       <p:sp>
         <p:nvSpPr>
           <p:cNvPr id="2" name="Titel 1">
@@ -13700,7 +14297,7 @@
             <a:fld id="{429C9586-58E4-4FC0-AB55-F3088F3AED5E}" type="slidenum">
               <a:rPr lang="de-DE" smtClean="0"/>
               <a:pPr/>
-              <a:t>20</a:t>
+              <a:t>21</a:t>
             </a:fld>
             <a:endParaRPr lang="de-DE" dirty="0"/>
           </a:p>
@@ -13884,7 +14481,7 @@
 </p:sld>
 </file>
 
-<file path=ppt/slides/slide21.xml><?xml version="1.0" encoding="utf-8"?>
+<file path=ppt/slides/slide22.xml><?xml version="1.0" encoding="utf-8"?>
 <p:sld xmlns:a="http://schemas.openxmlformats.org/drawingml/2006/main" xmlns:r="http://schemas.openxmlformats.org/officeDocument/2006/relationships" xmlns:p="http://schemas.openxmlformats.org/presentationml/2006/main" show="0">
   <p:cSld>
     <p:spTree>
@@ -13997,7 +14594,7 @@
             <a:fld id="{429C9586-58E4-4FC0-AB55-F3088F3AED5E}" type="slidenum">
               <a:rPr lang="de-DE" smtClean="0"/>
               <a:pPr/>
-              <a:t>21</a:t>
+              <a:t>22</a:t>
             </a:fld>
             <a:endParaRPr lang="de-DE" dirty="0"/>
           </a:p>
@@ -14343,7 +14940,7 @@
 </p:sld>
 </file>
 
-<file path=ppt/slides/slide22.xml><?xml version="1.0" encoding="utf-8"?>
+<file path=ppt/slides/slide23.xml><?xml version="1.0" encoding="utf-8"?>
 <p:sld xmlns:a="http://schemas.openxmlformats.org/drawingml/2006/main" xmlns:r="http://schemas.openxmlformats.org/officeDocument/2006/relationships" xmlns:p="http://schemas.openxmlformats.org/presentationml/2006/main" show="0">
   <p:cSld>
     <p:spTree>
@@ -14456,7 +15053,7 @@
             <a:fld id="{429C9586-58E4-4FC0-AB55-F3088F3AED5E}" type="slidenum">
               <a:rPr lang="de-DE" smtClean="0"/>
               <a:pPr/>
-              <a:t>22</a:t>
+              <a:t>23</a:t>
             </a:fld>
             <a:endParaRPr lang="de-DE" dirty="0"/>
           </a:p>

</xml_diff>